<commit_message>
Updated 6th set of slides
</commit_message>
<xml_diff>
--- a/slides/Lecture6.pptx
+++ b/slides/Lecture6.pptx
@@ -5,10 +5,10 @@
     <p:sldMasterId id="2147483693" r:id="rId1"/>
   </p:sldMasterIdLst>
   <p:notesMasterIdLst>
-    <p:notesMasterId r:id="rId14"/>
+    <p:notesMasterId r:id="rId18"/>
   </p:notesMasterIdLst>
   <p:handoutMasterIdLst>
-    <p:handoutMasterId r:id="rId15"/>
+    <p:handoutMasterId r:id="rId19"/>
   </p:handoutMasterIdLst>
   <p:sldIdLst>
     <p:sldId id="389" r:id="rId2"/>
@@ -23,6 +23,10 @@
     <p:sldId id="390" r:id="rId11"/>
     <p:sldId id="391" r:id="rId12"/>
     <p:sldId id="411" r:id="rId13"/>
+    <p:sldId id="412" r:id="rId14"/>
+    <p:sldId id="413" r:id="rId15"/>
+    <p:sldId id="414" r:id="rId16"/>
+    <p:sldId id="415" r:id="rId17"/>
   </p:sldIdLst>
   <p:sldSz cx="9144000" cy="6858000" type="screen4x3"/>
   <p:notesSz cx="6858000" cy="9144000"/>
@@ -692,7 +696,7 @@
         <p:nvSpPr>
           <p:cNvPr id="3076" name="Rectangle 4"/>
           <p:cNvSpPr>
-            <a:spLocks noRot="1" noChangeArrowheads="1" noTextEdit="1"/>
+            <a:spLocks noGrp="1" noRot="1" noChangeAspect="1" noChangeArrowheads="1" noTextEdit="1"/>
           </p:cNvSpPr>
           <p:nvPr>
             <p:ph type="sldImg" idx="2"/>
@@ -1292,7 +1296,7 @@
         <p:nvSpPr>
           <p:cNvPr id="7171" name="Rectangle 2"/>
           <p:cNvSpPr>
-            <a:spLocks noRot="1" noChangeArrowheads="1" noTextEdit="1"/>
+            <a:spLocks noGrp="1" noRot="1" noChangeAspect="1" noChangeArrowheads="1" noTextEdit="1"/>
           </p:cNvSpPr>
           <p:nvPr>
             <p:ph type="sldImg"/>
@@ -1328,6 +1332,227 @@
         </p:txBody>
       </p:sp>
     </p:spTree>
+  </p:cSld>
+  <p:clrMapOvr>
+    <a:masterClrMapping/>
+  </p:clrMapOvr>
+</p:notes>
+</file>
+
+<file path=ppt/notesSlides/notesSlide10.xml><?xml version="1.0" encoding="utf-8"?>
+<p:notes xmlns:a="http://schemas.openxmlformats.org/drawingml/2006/main" xmlns:r="http://schemas.openxmlformats.org/officeDocument/2006/relationships" xmlns:p="http://schemas.openxmlformats.org/presentationml/2006/main">
+  <p:cSld>
+    <p:spTree>
+      <p:nvGrpSpPr>
+        <p:cNvPr id="1" name=""/>
+        <p:cNvGrpSpPr/>
+        <p:nvPr/>
+      </p:nvGrpSpPr>
+      <p:grpSpPr>
+        <a:xfrm>
+          <a:off x="0" y="0"/>
+          <a:ext cx="0" cy="0"/>
+          <a:chOff x="0" y="0"/>
+          <a:chExt cx="0" cy="0"/>
+        </a:xfrm>
+      </p:grpSpPr>
+      <p:sp>
+        <p:nvSpPr>
+          <p:cNvPr id="10242" name="Slide Image Placeholder 1"/>
+          <p:cNvSpPr>
+            <a:spLocks noGrp="1" noRot="1" noChangeAspect="1" noTextEdit="1"/>
+          </p:cNvSpPr>
+          <p:nvPr>
+            <p:ph type="sldImg"/>
+          </p:nvPr>
+        </p:nvSpPr>
+        <p:spPr>
+          <a:ln/>
+        </p:spPr>
+      </p:sp>
+      <p:sp>
+        <p:nvSpPr>
+          <p:cNvPr id="10243" name="Notes Placeholder 2"/>
+          <p:cNvSpPr>
+            <a:spLocks noGrp="1"/>
+          </p:cNvSpPr>
+          <p:nvPr>
+            <p:ph type="body" idx="1"/>
+          </p:nvPr>
+        </p:nvSpPr>
+        <p:spPr>
+          <a:noFill/>
+        </p:spPr>
+        <p:txBody>
+          <a:bodyPr/>
+          <a:lstStyle/>
+          <a:p>
+            <a:endParaRPr lang="en-US" altLang="en-US" smtClean="0"/>
+          </a:p>
+        </p:txBody>
+      </p:sp>
+      <p:sp>
+        <p:nvSpPr>
+          <p:cNvPr id="10244" name="Slide Number Placeholder 3"/>
+          <p:cNvSpPr>
+            <a:spLocks noGrp="1"/>
+          </p:cNvSpPr>
+          <p:nvPr>
+            <p:ph type="sldNum" sz="quarter" idx="5"/>
+          </p:nvPr>
+        </p:nvSpPr>
+        <p:spPr>
+          <a:noFill/>
+        </p:spPr>
+        <p:txBody>
+          <a:bodyPr/>
+          <a:lstStyle>
+            <a:lvl1pPr>
+              <a:spcBef>
+                <a:spcPct val="30000"/>
+              </a:spcBef>
+              <a:defRPr sz="1200">
+                <a:solidFill>
+                  <a:schemeClr val="tx1"/>
+                </a:solidFill>
+                <a:latin typeface="Arial" panose="020B0604020202020204" pitchFamily="34" charset="0"/>
+                <a:cs typeface="Arial" panose="020B0604020202020204" pitchFamily="34" charset="0"/>
+              </a:defRPr>
+            </a:lvl1pPr>
+            <a:lvl2pPr marL="742950" indent="-285750">
+              <a:spcBef>
+                <a:spcPct val="30000"/>
+              </a:spcBef>
+              <a:defRPr sz="1200">
+                <a:solidFill>
+                  <a:schemeClr val="tx1"/>
+                </a:solidFill>
+                <a:latin typeface="Arial" panose="020B0604020202020204" pitchFamily="34" charset="0"/>
+                <a:cs typeface="Arial" panose="020B0604020202020204" pitchFamily="34" charset="0"/>
+              </a:defRPr>
+            </a:lvl2pPr>
+            <a:lvl3pPr marL="1143000" indent="-228600">
+              <a:spcBef>
+                <a:spcPct val="30000"/>
+              </a:spcBef>
+              <a:defRPr sz="1200">
+                <a:solidFill>
+                  <a:schemeClr val="tx1"/>
+                </a:solidFill>
+                <a:latin typeface="Arial" panose="020B0604020202020204" pitchFamily="34" charset="0"/>
+                <a:cs typeface="Arial" panose="020B0604020202020204" pitchFamily="34" charset="0"/>
+              </a:defRPr>
+            </a:lvl3pPr>
+            <a:lvl4pPr marL="1600200" indent="-228600">
+              <a:spcBef>
+                <a:spcPct val="30000"/>
+              </a:spcBef>
+              <a:defRPr sz="1200">
+                <a:solidFill>
+                  <a:schemeClr val="tx1"/>
+                </a:solidFill>
+                <a:latin typeface="Arial" panose="020B0604020202020204" pitchFamily="34" charset="0"/>
+                <a:cs typeface="Arial" panose="020B0604020202020204" pitchFamily="34" charset="0"/>
+              </a:defRPr>
+            </a:lvl4pPr>
+            <a:lvl5pPr marL="2057400" indent="-228600">
+              <a:spcBef>
+                <a:spcPct val="30000"/>
+              </a:spcBef>
+              <a:defRPr sz="1200">
+                <a:solidFill>
+                  <a:schemeClr val="tx1"/>
+                </a:solidFill>
+                <a:latin typeface="Arial" panose="020B0604020202020204" pitchFamily="34" charset="0"/>
+                <a:cs typeface="Arial" panose="020B0604020202020204" pitchFamily="34" charset="0"/>
+              </a:defRPr>
+            </a:lvl5pPr>
+            <a:lvl6pPr marL="2514600" indent="-228600" eaLnBrk="0" fontAlgn="base" hangingPunct="0">
+              <a:spcBef>
+                <a:spcPct val="30000"/>
+              </a:spcBef>
+              <a:spcAft>
+                <a:spcPct val="0"/>
+              </a:spcAft>
+              <a:defRPr sz="1200">
+                <a:solidFill>
+                  <a:schemeClr val="tx1"/>
+                </a:solidFill>
+                <a:latin typeface="Arial" panose="020B0604020202020204" pitchFamily="34" charset="0"/>
+                <a:cs typeface="Arial" panose="020B0604020202020204" pitchFamily="34" charset="0"/>
+              </a:defRPr>
+            </a:lvl6pPr>
+            <a:lvl7pPr marL="2971800" indent="-228600" eaLnBrk="0" fontAlgn="base" hangingPunct="0">
+              <a:spcBef>
+                <a:spcPct val="30000"/>
+              </a:spcBef>
+              <a:spcAft>
+                <a:spcPct val="0"/>
+              </a:spcAft>
+              <a:defRPr sz="1200">
+                <a:solidFill>
+                  <a:schemeClr val="tx1"/>
+                </a:solidFill>
+                <a:latin typeface="Arial" panose="020B0604020202020204" pitchFamily="34" charset="0"/>
+                <a:cs typeface="Arial" panose="020B0604020202020204" pitchFamily="34" charset="0"/>
+              </a:defRPr>
+            </a:lvl7pPr>
+            <a:lvl8pPr marL="3429000" indent="-228600" eaLnBrk="0" fontAlgn="base" hangingPunct="0">
+              <a:spcBef>
+                <a:spcPct val="30000"/>
+              </a:spcBef>
+              <a:spcAft>
+                <a:spcPct val="0"/>
+              </a:spcAft>
+              <a:defRPr sz="1200">
+                <a:solidFill>
+                  <a:schemeClr val="tx1"/>
+                </a:solidFill>
+                <a:latin typeface="Arial" panose="020B0604020202020204" pitchFamily="34" charset="0"/>
+                <a:cs typeface="Arial" panose="020B0604020202020204" pitchFamily="34" charset="0"/>
+              </a:defRPr>
+            </a:lvl8pPr>
+            <a:lvl9pPr marL="3886200" indent="-228600" eaLnBrk="0" fontAlgn="base" hangingPunct="0">
+              <a:spcBef>
+                <a:spcPct val="30000"/>
+              </a:spcBef>
+              <a:spcAft>
+                <a:spcPct val="0"/>
+              </a:spcAft>
+              <a:defRPr sz="1200">
+                <a:solidFill>
+                  <a:schemeClr val="tx1"/>
+                </a:solidFill>
+                <a:latin typeface="Arial" panose="020B0604020202020204" pitchFamily="34" charset="0"/>
+                <a:cs typeface="Arial" panose="020B0604020202020204" pitchFamily="34" charset="0"/>
+              </a:defRPr>
+            </a:lvl9pPr>
+          </a:lstStyle>
+          <a:p>
+            <a:pPr>
+              <a:spcBef>
+                <a:spcPct val="0"/>
+              </a:spcBef>
+            </a:pPr>
+            <a:fld id="{EC3A3B28-F29A-495C-AF41-77700C52CE44}" type="slidenum">
+              <a:rPr lang="en-US" altLang="en-US" smtClean="0"/>
+              <a:pPr>
+                <a:spcBef>
+                  <a:spcPct val="0"/>
+                </a:spcBef>
+              </a:pPr>
+              <a:t>16</a:t>
+            </a:fld>
+            <a:endParaRPr lang="en-US" altLang="en-US" smtClean="0"/>
+          </a:p>
+        </p:txBody>
+      </p:sp>
+    </p:spTree>
+    <p:extLst>
+      <p:ext uri="{BB962C8B-B14F-4D97-AF65-F5344CB8AC3E}">
+        <p14:creationId xmlns:p14="http://schemas.microsoft.com/office/powerpoint/2010/main" val="4070137276"/>
+      </p:ext>
+    </p:extLst>
   </p:cSld>
   <p:clrMapOvr>
     <a:masterClrMapping/>
@@ -2861,6 +3086,227 @@
         </p:txBody>
       </p:sp>
     </p:spTree>
+  </p:cSld>
+  <p:clrMapOvr>
+    <a:masterClrMapping/>
+  </p:clrMapOvr>
+</p:notes>
+</file>
+
+<file path=ppt/notesSlides/notesSlide9.xml><?xml version="1.0" encoding="utf-8"?>
+<p:notes xmlns:a="http://schemas.openxmlformats.org/drawingml/2006/main" xmlns:r="http://schemas.openxmlformats.org/officeDocument/2006/relationships" xmlns:p="http://schemas.openxmlformats.org/presentationml/2006/main">
+  <p:cSld>
+    <p:spTree>
+      <p:nvGrpSpPr>
+        <p:cNvPr id="1" name=""/>
+        <p:cNvGrpSpPr/>
+        <p:nvPr/>
+      </p:nvGrpSpPr>
+      <p:grpSpPr>
+        <a:xfrm>
+          <a:off x="0" y="0"/>
+          <a:ext cx="0" cy="0"/>
+          <a:chOff x="0" y="0"/>
+          <a:chExt cx="0" cy="0"/>
+        </a:xfrm>
+      </p:grpSpPr>
+      <p:sp>
+        <p:nvSpPr>
+          <p:cNvPr id="7170" name="Slide Image Placeholder 1"/>
+          <p:cNvSpPr>
+            <a:spLocks noGrp="1" noRot="1" noChangeAspect="1" noTextEdit="1"/>
+          </p:cNvSpPr>
+          <p:nvPr>
+            <p:ph type="sldImg"/>
+          </p:nvPr>
+        </p:nvSpPr>
+        <p:spPr>
+          <a:ln/>
+        </p:spPr>
+      </p:sp>
+      <p:sp>
+        <p:nvSpPr>
+          <p:cNvPr id="7171" name="Notes Placeholder 2"/>
+          <p:cNvSpPr>
+            <a:spLocks noGrp="1"/>
+          </p:cNvSpPr>
+          <p:nvPr>
+            <p:ph type="body" idx="1"/>
+          </p:nvPr>
+        </p:nvSpPr>
+        <p:spPr>
+          <a:noFill/>
+        </p:spPr>
+        <p:txBody>
+          <a:bodyPr/>
+          <a:lstStyle/>
+          <a:p>
+            <a:endParaRPr lang="en-US" altLang="en-US" smtClean="0"/>
+          </a:p>
+        </p:txBody>
+      </p:sp>
+      <p:sp>
+        <p:nvSpPr>
+          <p:cNvPr id="7172" name="Slide Number Placeholder 3"/>
+          <p:cNvSpPr>
+            <a:spLocks noGrp="1"/>
+          </p:cNvSpPr>
+          <p:nvPr>
+            <p:ph type="sldNum" sz="quarter" idx="5"/>
+          </p:nvPr>
+        </p:nvSpPr>
+        <p:spPr>
+          <a:noFill/>
+        </p:spPr>
+        <p:txBody>
+          <a:bodyPr/>
+          <a:lstStyle>
+            <a:lvl1pPr>
+              <a:spcBef>
+                <a:spcPct val="30000"/>
+              </a:spcBef>
+              <a:defRPr sz="1200">
+                <a:solidFill>
+                  <a:schemeClr val="tx1"/>
+                </a:solidFill>
+                <a:latin typeface="Arial" panose="020B0604020202020204" pitchFamily="34" charset="0"/>
+                <a:cs typeface="Arial" panose="020B0604020202020204" pitchFamily="34" charset="0"/>
+              </a:defRPr>
+            </a:lvl1pPr>
+            <a:lvl2pPr marL="742950" indent="-285750">
+              <a:spcBef>
+                <a:spcPct val="30000"/>
+              </a:spcBef>
+              <a:defRPr sz="1200">
+                <a:solidFill>
+                  <a:schemeClr val="tx1"/>
+                </a:solidFill>
+                <a:latin typeface="Arial" panose="020B0604020202020204" pitchFamily="34" charset="0"/>
+                <a:cs typeface="Arial" panose="020B0604020202020204" pitchFamily="34" charset="0"/>
+              </a:defRPr>
+            </a:lvl2pPr>
+            <a:lvl3pPr marL="1143000" indent="-228600">
+              <a:spcBef>
+                <a:spcPct val="30000"/>
+              </a:spcBef>
+              <a:defRPr sz="1200">
+                <a:solidFill>
+                  <a:schemeClr val="tx1"/>
+                </a:solidFill>
+                <a:latin typeface="Arial" panose="020B0604020202020204" pitchFamily="34" charset="0"/>
+                <a:cs typeface="Arial" panose="020B0604020202020204" pitchFamily="34" charset="0"/>
+              </a:defRPr>
+            </a:lvl3pPr>
+            <a:lvl4pPr marL="1600200" indent="-228600">
+              <a:spcBef>
+                <a:spcPct val="30000"/>
+              </a:spcBef>
+              <a:defRPr sz="1200">
+                <a:solidFill>
+                  <a:schemeClr val="tx1"/>
+                </a:solidFill>
+                <a:latin typeface="Arial" panose="020B0604020202020204" pitchFamily="34" charset="0"/>
+                <a:cs typeface="Arial" panose="020B0604020202020204" pitchFamily="34" charset="0"/>
+              </a:defRPr>
+            </a:lvl4pPr>
+            <a:lvl5pPr marL="2057400" indent="-228600">
+              <a:spcBef>
+                <a:spcPct val="30000"/>
+              </a:spcBef>
+              <a:defRPr sz="1200">
+                <a:solidFill>
+                  <a:schemeClr val="tx1"/>
+                </a:solidFill>
+                <a:latin typeface="Arial" panose="020B0604020202020204" pitchFamily="34" charset="0"/>
+                <a:cs typeface="Arial" panose="020B0604020202020204" pitchFamily="34" charset="0"/>
+              </a:defRPr>
+            </a:lvl5pPr>
+            <a:lvl6pPr marL="2514600" indent="-228600" eaLnBrk="0" fontAlgn="base" hangingPunct="0">
+              <a:spcBef>
+                <a:spcPct val="30000"/>
+              </a:spcBef>
+              <a:spcAft>
+                <a:spcPct val="0"/>
+              </a:spcAft>
+              <a:defRPr sz="1200">
+                <a:solidFill>
+                  <a:schemeClr val="tx1"/>
+                </a:solidFill>
+                <a:latin typeface="Arial" panose="020B0604020202020204" pitchFamily="34" charset="0"/>
+                <a:cs typeface="Arial" panose="020B0604020202020204" pitchFamily="34" charset="0"/>
+              </a:defRPr>
+            </a:lvl6pPr>
+            <a:lvl7pPr marL="2971800" indent="-228600" eaLnBrk="0" fontAlgn="base" hangingPunct="0">
+              <a:spcBef>
+                <a:spcPct val="30000"/>
+              </a:spcBef>
+              <a:spcAft>
+                <a:spcPct val="0"/>
+              </a:spcAft>
+              <a:defRPr sz="1200">
+                <a:solidFill>
+                  <a:schemeClr val="tx1"/>
+                </a:solidFill>
+                <a:latin typeface="Arial" panose="020B0604020202020204" pitchFamily="34" charset="0"/>
+                <a:cs typeface="Arial" panose="020B0604020202020204" pitchFamily="34" charset="0"/>
+              </a:defRPr>
+            </a:lvl7pPr>
+            <a:lvl8pPr marL="3429000" indent="-228600" eaLnBrk="0" fontAlgn="base" hangingPunct="0">
+              <a:spcBef>
+                <a:spcPct val="30000"/>
+              </a:spcBef>
+              <a:spcAft>
+                <a:spcPct val="0"/>
+              </a:spcAft>
+              <a:defRPr sz="1200">
+                <a:solidFill>
+                  <a:schemeClr val="tx1"/>
+                </a:solidFill>
+                <a:latin typeface="Arial" panose="020B0604020202020204" pitchFamily="34" charset="0"/>
+                <a:cs typeface="Arial" panose="020B0604020202020204" pitchFamily="34" charset="0"/>
+              </a:defRPr>
+            </a:lvl8pPr>
+            <a:lvl9pPr marL="3886200" indent="-228600" eaLnBrk="0" fontAlgn="base" hangingPunct="0">
+              <a:spcBef>
+                <a:spcPct val="30000"/>
+              </a:spcBef>
+              <a:spcAft>
+                <a:spcPct val="0"/>
+              </a:spcAft>
+              <a:defRPr sz="1200">
+                <a:solidFill>
+                  <a:schemeClr val="tx1"/>
+                </a:solidFill>
+                <a:latin typeface="Arial" panose="020B0604020202020204" pitchFamily="34" charset="0"/>
+                <a:cs typeface="Arial" panose="020B0604020202020204" pitchFamily="34" charset="0"/>
+              </a:defRPr>
+            </a:lvl9pPr>
+          </a:lstStyle>
+          <a:p>
+            <a:pPr>
+              <a:spcBef>
+                <a:spcPct val="0"/>
+              </a:spcBef>
+            </a:pPr>
+            <a:fld id="{AD90A551-824E-4803-BDC6-FB7FE118C750}" type="slidenum">
+              <a:rPr lang="en-US" altLang="en-US" smtClean="0"/>
+              <a:pPr>
+                <a:spcBef>
+                  <a:spcPct val="0"/>
+                </a:spcBef>
+              </a:pPr>
+              <a:t>14</a:t>
+            </a:fld>
+            <a:endParaRPr lang="en-US" altLang="en-US" smtClean="0"/>
+          </a:p>
+        </p:txBody>
+      </p:sp>
+    </p:spTree>
+    <p:extLst>
+      <p:ext uri="{BB962C8B-B14F-4D97-AF65-F5344CB8AC3E}">
+        <p14:creationId xmlns:p14="http://schemas.microsoft.com/office/powerpoint/2010/main" val="1051286050"/>
+      </p:ext>
+    </p:extLst>
   </p:cSld>
   <p:clrMapOvr>
     <a:masterClrMapping/>
@@ -17470,6 +17916,1710 @@
 </p:sld>
 </file>
 
+<file path=ppt/slides/slide13.xml><?xml version="1.0" encoding="utf-8"?>
+<p:sld xmlns:a="http://schemas.openxmlformats.org/drawingml/2006/main" xmlns:r="http://schemas.openxmlformats.org/officeDocument/2006/relationships" xmlns:p="http://schemas.openxmlformats.org/presentationml/2006/main">
+  <p:cSld>
+    <p:spTree>
+      <p:nvGrpSpPr>
+        <p:cNvPr id="1" name=""/>
+        <p:cNvGrpSpPr/>
+        <p:nvPr/>
+      </p:nvGrpSpPr>
+      <p:grpSpPr>
+        <a:xfrm>
+          <a:off x="0" y="0"/>
+          <a:ext cx="0" cy="0"/>
+          <a:chOff x="0" y="0"/>
+          <a:chExt cx="0" cy="0"/>
+        </a:xfrm>
+      </p:grpSpPr>
+      <p:sp>
+        <p:nvSpPr>
+          <p:cNvPr id="5122" name="Title 1"/>
+          <p:cNvSpPr>
+            <a:spLocks noGrp="1"/>
+          </p:cNvSpPr>
+          <p:nvPr>
+            <p:ph type="ctrTitle"/>
+          </p:nvPr>
+        </p:nvSpPr>
+        <p:spPr/>
+        <p:txBody>
+          <a:bodyPr/>
+          <a:lstStyle/>
+          <a:p>
+            <a:r>
+              <a:rPr lang="en-US" altLang="en-US" smtClean="0"/>
+              <a:t>Consuming </a:t>
+            </a:r>
+            <a:br>
+              <a:rPr lang="en-US" altLang="en-US" smtClean="0"/>
+            </a:br>
+            <a:r>
+              <a:rPr lang="en-US" altLang="en-US" smtClean="0"/>
+              <a:t>Java Script Object Notation (JSON) feeds</a:t>
+            </a:r>
+          </a:p>
+        </p:txBody>
+      </p:sp>
+    </p:spTree>
+    <p:extLst>
+      <p:ext uri="{BB962C8B-B14F-4D97-AF65-F5344CB8AC3E}">
+        <p14:creationId xmlns:p14="http://schemas.microsoft.com/office/powerpoint/2010/main" val="738248946"/>
+      </p:ext>
+    </p:extLst>
+  </p:cSld>
+  <p:clrMapOvr>
+    <a:masterClrMapping/>
+  </p:clrMapOvr>
+  <p:timing>
+    <p:tnLst>
+      <p:par>
+        <p:cTn id="1" dur="indefinite" restart="never" nodeType="tmRoot"/>
+      </p:par>
+    </p:tnLst>
+  </p:timing>
+</p:sld>
+</file>
+
+<file path=ppt/slides/slide14.xml><?xml version="1.0" encoding="utf-8"?>
+<p:sld xmlns:a="http://schemas.openxmlformats.org/drawingml/2006/main" xmlns:r="http://schemas.openxmlformats.org/officeDocument/2006/relationships" xmlns:p="http://schemas.openxmlformats.org/presentationml/2006/main">
+  <p:cSld>
+    <p:spTree>
+      <p:nvGrpSpPr>
+        <p:cNvPr id="1" name=""/>
+        <p:cNvGrpSpPr/>
+        <p:nvPr/>
+      </p:nvGrpSpPr>
+      <p:grpSpPr>
+        <a:xfrm>
+          <a:off x="0" y="0"/>
+          <a:ext cx="0" cy="0"/>
+          <a:chOff x="0" y="0"/>
+          <a:chExt cx="0" cy="0"/>
+        </a:xfrm>
+      </p:grpSpPr>
+      <p:sp>
+        <p:nvSpPr>
+          <p:cNvPr id="6146" name="Title 1"/>
+          <p:cNvSpPr>
+            <a:spLocks noGrp="1"/>
+          </p:cNvSpPr>
+          <p:nvPr>
+            <p:ph type="title"/>
+          </p:nvPr>
+        </p:nvSpPr>
+        <p:spPr>
+          <a:xfrm>
+            <a:off x="0" y="-381000"/>
+            <a:ext cx="7543800" cy="1295400"/>
+          </a:xfrm>
+        </p:spPr>
+        <p:txBody>
+          <a:bodyPr/>
+          <a:lstStyle/>
+          <a:p>
+            <a:r>
+              <a:rPr lang="en-US" altLang="en-US" smtClean="0"/>
+              <a:t>What is JSON?	</a:t>
+            </a:r>
+          </a:p>
+        </p:txBody>
+      </p:sp>
+      <p:sp>
+        <p:nvSpPr>
+          <p:cNvPr id="6147" name="Content Placeholder 2"/>
+          <p:cNvSpPr>
+            <a:spLocks noGrp="1"/>
+          </p:cNvSpPr>
+          <p:nvPr>
+            <p:ph idx="1"/>
+          </p:nvPr>
+        </p:nvSpPr>
+        <p:spPr>
+          <a:xfrm>
+            <a:off x="0" y="1066800"/>
+            <a:ext cx="8229600" cy="4411663"/>
+          </a:xfrm>
+        </p:spPr>
+        <p:txBody>
+          <a:bodyPr/>
+          <a:lstStyle/>
+          <a:p>
+            <a:r>
+              <a:rPr lang="en-US" altLang="en-US" smtClean="0"/>
+              <a:t>JSON</a:t>
+            </a:r>
+          </a:p>
+          <a:p>
+            <a:pPr lvl="1"/>
+            <a:r>
+              <a:rPr lang="en-US" altLang="en-US" smtClean="0"/>
+              <a:t>stands for </a:t>
+            </a:r>
+            <a:r>
+              <a:rPr lang="en-US" altLang="en-US" b="1" smtClean="0"/>
+              <a:t>J</a:t>
+            </a:r>
+            <a:r>
+              <a:rPr lang="en-US" altLang="en-US" smtClean="0"/>
+              <a:t>ava</a:t>
+            </a:r>
+            <a:r>
+              <a:rPr lang="en-US" altLang="en-US" b="1" smtClean="0"/>
+              <a:t>S</a:t>
+            </a:r>
+            <a:r>
+              <a:rPr lang="en-US" altLang="en-US" smtClean="0"/>
+              <a:t>cript </a:t>
+            </a:r>
+            <a:r>
+              <a:rPr lang="en-US" altLang="en-US" b="1" smtClean="0"/>
+              <a:t>O</a:t>
+            </a:r>
+            <a:r>
+              <a:rPr lang="en-US" altLang="en-US" smtClean="0"/>
+              <a:t>bject </a:t>
+            </a:r>
+            <a:r>
+              <a:rPr lang="en-US" altLang="en-US" b="1" smtClean="0"/>
+              <a:t>N</a:t>
+            </a:r>
+            <a:r>
+              <a:rPr lang="en-US" altLang="en-US" smtClean="0"/>
+              <a:t>otation</a:t>
+            </a:r>
+          </a:p>
+          <a:p>
+            <a:pPr lvl="1"/>
+            <a:endParaRPr lang="en-US" altLang="en-US" smtClean="0"/>
+          </a:p>
+          <a:p>
+            <a:pPr lvl="1"/>
+            <a:r>
+              <a:rPr lang="en-US" altLang="en-US" smtClean="0"/>
+              <a:t>is syntax for storing and exchanging text information</a:t>
+            </a:r>
+          </a:p>
+          <a:p>
+            <a:pPr lvl="2"/>
+            <a:r>
+              <a:rPr lang="en-US" altLang="en-US" smtClean="0"/>
+              <a:t>Much like XML</a:t>
+            </a:r>
+          </a:p>
+          <a:p>
+            <a:pPr lvl="2"/>
+            <a:endParaRPr lang="en-US" altLang="en-US" smtClean="0"/>
+          </a:p>
+          <a:p>
+            <a:pPr lvl="1"/>
+            <a:r>
+              <a:rPr lang="en-US" altLang="en-US" smtClean="0"/>
+              <a:t>is smaller than XML, and faster and easier to parse</a:t>
+            </a:r>
+          </a:p>
+        </p:txBody>
+      </p:sp>
+      <p:sp>
+        <p:nvSpPr>
+          <p:cNvPr id="6148" name="TextBox 3"/>
+          <p:cNvSpPr txBox="1">
+            <a:spLocks noChangeArrowheads="1"/>
+          </p:cNvSpPr>
+          <p:nvPr/>
+        </p:nvSpPr>
+        <p:spPr bwMode="auto">
+          <a:xfrm>
+            <a:off x="990600" y="4114800"/>
+            <a:ext cx="6172200" cy="2586038"/>
+          </a:xfrm>
+          <a:prstGeom prst="rect">
+            <a:avLst/>
+          </a:prstGeom>
+          <a:noFill/>
+          <a:ln w="25400">
+            <a:solidFill>
+              <a:schemeClr val="tx1"/>
+            </a:solidFill>
+            <a:miter lim="800000"/>
+            <a:headEnd/>
+            <a:tailEnd/>
+          </a:ln>
+          <a:extLst>
+            <a:ext uri="{909E8E84-426E-40DD-AFC4-6F175D3DCCD1}">
+              <a14:hiddenFill xmlns:a14="http://schemas.microsoft.com/office/drawing/2010/main">
+                <a:solidFill>
+                  <a:srgbClr val="FFFFFF"/>
+                </a:solidFill>
+              </a14:hiddenFill>
+            </a:ext>
+          </a:extLst>
+        </p:spPr>
+        <p:txBody>
+          <a:bodyPr>
+            <a:spAutoFit/>
+          </a:bodyPr>
+          <a:lstStyle>
+            <a:lvl1pPr>
+              <a:spcBef>
+                <a:spcPct val="20000"/>
+              </a:spcBef>
+              <a:buClr>
+                <a:schemeClr val="tx2"/>
+              </a:buClr>
+              <a:buSzPct val="70000"/>
+              <a:buFont typeface="Wingdings" panose="05000000000000000000" pitchFamily="2" charset="2"/>
+              <a:buChar char="l"/>
+              <a:defRPr sz="2600">
+                <a:solidFill>
+                  <a:schemeClr val="tx1"/>
+                </a:solidFill>
+                <a:latin typeface="Arial" panose="020B0604020202020204" pitchFamily="34" charset="0"/>
+                <a:cs typeface="Arial" panose="020B0604020202020204" pitchFamily="34" charset="0"/>
+              </a:defRPr>
+            </a:lvl1pPr>
+            <a:lvl2pPr marL="742950" indent="-285750">
+              <a:spcBef>
+                <a:spcPct val="20000"/>
+              </a:spcBef>
+              <a:buClr>
+                <a:schemeClr val="accent2"/>
+              </a:buClr>
+              <a:buSzPct val="70000"/>
+              <a:buFont typeface="Wingdings" panose="05000000000000000000" pitchFamily="2" charset="2"/>
+              <a:buChar char="l"/>
+              <a:defRPr sz="2300">
+                <a:solidFill>
+                  <a:schemeClr val="tx1"/>
+                </a:solidFill>
+                <a:latin typeface="Arial" panose="020B0604020202020204" pitchFamily="34" charset="0"/>
+                <a:cs typeface="Arial" panose="020B0604020202020204" pitchFamily="34" charset="0"/>
+              </a:defRPr>
+            </a:lvl2pPr>
+            <a:lvl3pPr marL="1143000" indent="-228600">
+              <a:spcBef>
+                <a:spcPct val="20000"/>
+              </a:spcBef>
+              <a:buClr>
+                <a:schemeClr val="accent1"/>
+              </a:buClr>
+              <a:buSzPct val="70000"/>
+              <a:buFont typeface="Wingdings" panose="05000000000000000000" pitchFamily="2" charset="2"/>
+              <a:buChar char="l"/>
+              <a:defRPr sz="2000">
+                <a:solidFill>
+                  <a:schemeClr val="tx1"/>
+                </a:solidFill>
+                <a:latin typeface="Arial" panose="020B0604020202020204" pitchFamily="34" charset="0"/>
+                <a:cs typeface="Arial" panose="020B0604020202020204" pitchFamily="34" charset="0"/>
+              </a:defRPr>
+            </a:lvl3pPr>
+            <a:lvl4pPr marL="1600200" indent="-228600">
+              <a:spcBef>
+                <a:spcPct val="20000"/>
+              </a:spcBef>
+              <a:buClr>
+                <a:schemeClr val="tx2"/>
+              </a:buClr>
+              <a:buSzPct val="75000"/>
+              <a:buFont typeface="Wingdings" panose="05000000000000000000" pitchFamily="2" charset="2"/>
+              <a:buChar char="§"/>
+              <a:defRPr sz="2000">
+                <a:solidFill>
+                  <a:schemeClr val="tx1"/>
+                </a:solidFill>
+                <a:latin typeface="Arial" panose="020B0604020202020204" pitchFamily="34" charset="0"/>
+                <a:cs typeface="Arial" panose="020B0604020202020204" pitchFamily="34" charset="0"/>
+              </a:defRPr>
+            </a:lvl4pPr>
+            <a:lvl5pPr marL="2057400" indent="-228600">
+              <a:spcBef>
+                <a:spcPct val="20000"/>
+              </a:spcBef>
+              <a:buClr>
+                <a:schemeClr val="folHlink"/>
+              </a:buClr>
+              <a:buSzPct val="80000"/>
+              <a:buFont typeface="Wingdings" panose="05000000000000000000" pitchFamily="2" charset="2"/>
+              <a:buChar char="§"/>
+              <a:defRPr sz="2000">
+                <a:solidFill>
+                  <a:schemeClr val="tx1"/>
+                </a:solidFill>
+                <a:latin typeface="Arial" panose="020B0604020202020204" pitchFamily="34" charset="0"/>
+                <a:cs typeface="Arial" panose="020B0604020202020204" pitchFamily="34" charset="0"/>
+              </a:defRPr>
+            </a:lvl5pPr>
+            <a:lvl6pPr marL="2514600" indent="-228600" eaLnBrk="0" fontAlgn="base" hangingPunct="0">
+              <a:spcBef>
+                <a:spcPct val="20000"/>
+              </a:spcBef>
+              <a:spcAft>
+                <a:spcPct val="0"/>
+              </a:spcAft>
+              <a:buClr>
+                <a:schemeClr val="folHlink"/>
+              </a:buClr>
+              <a:buSzPct val="80000"/>
+              <a:buFont typeface="Wingdings" panose="05000000000000000000" pitchFamily="2" charset="2"/>
+              <a:buChar char="§"/>
+              <a:defRPr sz="2000">
+                <a:solidFill>
+                  <a:schemeClr val="tx1"/>
+                </a:solidFill>
+                <a:latin typeface="Arial" panose="020B0604020202020204" pitchFamily="34" charset="0"/>
+                <a:cs typeface="Arial" panose="020B0604020202020204" pitchFamily="34" charset="0"/>
+              </a:defRPr>
+            </a:lvl6pPr>
+            <a:lvl7pPr marL="2971800" indent="-228600" eaLnBrk="0" fontAlgn="base" hangingPunct="0">
+              <a:spcBef>
+                <a:spcPct val="20000"/>
+              </a:spcBef>
+              <a:spcAft>
+                <a:spcPct val="0"/>
+              </a:spcAft>
+              <a:buClr>
+                <a:schemeClr val="folHlink"/>
+              </a:buClr>
+              <a:buSzPct val="80000"/>
+              <a:buFont typeface="Wingdings" panose="05000000000000000000" pitchFamily="2" charset="2"/>
+              <a:buChar char="§"/>
+              <a:defRPr sz="2000">
+                <a:solidFill>
+                  <a:schemeClr val="tx1"/>
+                </a:solidFill>
+                <a:latin typeface="Arial" panose="020B0604020202020204" pitchFamily="34" charset="0"/>
+                <a:cs typeface="Arial" panose="020B0604020202020204" pitchFamily="34" charset="0"/>
+              </a:defRPr>
+            </a:lvl7pPr>
+            <a:lvl8pPr marL="3429000" indent="-228600" eaLnBrk="0" fontAlgn="base" hangingPunct="0">
+              <a:spcBef>
+                <a:spcPct val="20000"/>
+              </a:spcBef>
+              <a:spcAft>
+                <a:spcPct val="0"/>
+              </a:spcAft>
+              <a:buClr>
+                <a:schemeClr val="folHlink"/>
+              </a:buClr>
+              <a:buSzPct val="80000"/>
+              <a:buFont typeface="Wingdings" panose="05000000000000000000" pitchFamily="2" charset="2"/>
+              <a:buChar char="§"/>
+              <a:defRPr sz="2000">
+                <a:solidFill>
+                  <a:schemeClr val="tx1"/>
+                </a:solidFill>
+                <a:latin typeface="Arial" panose="020B0604020202020204" pitchFamily="34" charset="0"/>
+                <a:cs typeface="Arial" panose="020B0604020202020204" pitchFamily="34" charset="0"/>
+              </a:defRPr>
+            </a:lvl8pPr>
+            <a:lvl9pPr marL="3886200" indent="-228600" eaLnBrk="0" fontAlgn="base" hangingPunct="0">
+              <a:spcBef>
+                <a:spcPct val="20000"/>
+              </a:spcBef>
+              <a:spcAft>
+                <a:spcPct val="0"/>
+              </a:spcAft>
+              <a:buClr>
+                <a:schemeClr val="folHlink"/>
+              </a:buClr>
+              <a:buSzPct val="80000"/>
+              <a:buFont typeface="Wingdings" panose="05000000000000000000" pitchFamily="2" charset="2"/>
+              <a:buChar char="§"/>
+              <a:defRPr sz="2000">
+                <a:solidFill>
+                  <a:schemeClr val="tx1"/>
+                </a:solidFill>
+                <a:latin typeface="Arial" panose="020B0604020202020204" pitchFamily="34" charset="0"/>
+                <a:cs typeface="Arial" panose="020B0604020202020204" pitchFamily="34" charset="0"/>
+              </a:defRPr>
+            </a:lvl9pPr>
+          </a:lstStyle>
+          <a:p>
+            <a:pPr eaLnBrk="1" hangingPunct="1">
+              <a:spcBef>
+                <a:spcPct val="0"/>
+              </a:spcBef>
+              <a:buClrTx/>
+              <a:buSzTx/>
+              <a:buFontTx/>
+              <a:buNone/>
+            </a:pPr>
+            <a:r>
+              <a:rPr lang="en-US" altLang="en-US" sz="1800">
+                <a:solidFill>
+                  <a:srgbClr val="000000"/>
+                </a:solidFill>
+                <a:latin typeface="courier new" panose="02070309020205020404" pitchFamily="49" charset="0"/>
+              </a:rPr>
+              <a:t>{</a:t>
+            </a:r>
+            <a:r>
+              <a:rPr lang="en-US" altLang="en-US" sz="1800"/>
+              <a:t/>
+            </a:r>
+            <a:br>
+              <a:rPr lang="en-US" altLang="en-US" sz="1800"/>
+            </a:br>
+            <a:r>
+              <a:rPr lang="en-US" altLang="en-US" sz="1800">
+                <a:solidFill>
+                  <a:srgbClr val="000000"/>
+                </a:solidFill>
+                <a:latin typeface="courier new" panose="02070309020205020404" pitchFamily="49" charset="0"/>
+              </a:rPr>
+              <a:t>"employees": [</a:t>
+            </a:r>
+            <a:r>
+              <a:rPr lang="en-US" altLang="en-US" sz="1800"/>
+              <a:t/>
+            </a:r>
+            <a:br>
+              <a:rPr lang="en-US" altLang="en-US" sz="1800"/>
+            </a:br>
+            <a:r>
+              <a:rPr lang="en-US" altLang="en-US" sz="1800">
+                <a:solidFill>
+                  <a:srgbClr val="000000"/>
+                </a:solidFill>
+                <a:latin typeface="courier new" panose="02070309020205020404" pitchFamily="49" charset="0"/>
+              </a:rPr>
+              <a:t>{ "firstName":"John" , "lastName":"Doe" }, </a:t>
+            </a:r>
+            <a:r>
+              <a:rPr lang="en-US" altLang="en-US" sz="1800"/>
+              <a:t/>
+            </a:r>
+            <a:br>
+              <a:rPr lang="en-US" altLang="en-US" sz="1800"/>
+            </a:br>
+            <a:r>
+              <a:rPr lang="en-US" altLang="en-US" sz="1800">
+                <a:solidFill>
+                  <a:srgbClr val="000000"/>
+                </a:solidFill>
+                <a:latin typeface="courier new" panose="02070309020205020404" pitchFamily="49" charset="0"/>
+              </a:rPr>
+              <a:t>{ "firstName":"Anna" , "lastName":"Smith" }, </a:t>
+            </a:r>
+            <a:r>
+              <a:rPr lang="en-US" altLang="en-US" sz="1800"/>
+              <a:t/>
+            </a:r>
+            <a:br>
+              <a:rPr lang="en-US" altLang="en-US" sz="1800"/>
+            </a:br>
+            <a:r>
+              <a:rPr lang="en-US" altLang="en-US" sz="1800">
+                <a:solidFill>
+                  <a:srgbClr val="000000"/>
+                </a:solidFill>
+                <a:latin typeface="courier new" panose="02070309020205020404" pitchFamily="49" charset="0"/>
+              </a:rPr>
+              <a:t>{ "firstName":"Peter" , "lastName":"Jones" }</a:t>
+            </a:r>
+            <a:r>
+              <a:rPr lang="en-US" altLang="en-US" sz="1800"/>
+              <a:t/>
+            </a:r>
+            <a:br>
+              <a:rPr lang="en-US" altLang="en-US" sz="1800"/>
+            </a:br>
+            <a:r>
+              <a:rPr lang="en-US" altLang="en-US" sz="1800">
+                <a:solidFill>
+                  <a:srgbClr val="000000"/>
+                </a:solidFill>
+                <a:latin typeface="courier new" panose="02070309020205020404" pitchFamily="49" charset="0"/>
+              </a:rPr>
+              <a:t>]</a:t>
+            </a:r>
+            <a:r>
+              <a:rPr lang="en-US" altLang="en-US" sz="1800"/>
+              <a:t/>
+            </a:r>
+            <a:br>
+              <a:rPr lang="en-US" altLang="en-US" sz="1800"/>
+            </a:br>
+            <a:r>
+              <a:rPr lang="en-US" altLang="en-US" sz="1800">
+                <a:solidFill>
+                  <a:srgbClr val="000000"/>
+                </a:solidFill>
+                <a:latin typeface="courier new" panose="02070309020205020404" pitchFamily="49" charset="0"/>
+              </a:rPr>
+              <a:t>}</a:t>
+            </a:r>
+            <a:endParaRPr lang="en-US" altLang="en-US" sz="1800"/>
+          </a:p>
+        </p:txBody>
+      </p:sp>
+    </p:spTree>
+    <p:extLst>
+      <p:ext uri="{BB962C8B-B14F-4D97-AF65-F5344CB8AC3E}">
+        <p14:creationId xmlns:p14="http://schemas.microsoft.com/office/powerpoint/2010/main" val="498662299"/>
+      </p:ext>
+    </p:extLst>
+  </p:cSld>
+  <p:clrMapOvr>
+    <a:masterClrMapping/>
+  </p:clrMapOvr>
+  <p:timing>
+    <p:tnLst>
+      <p:par>
+        <p:cTn id="1" dur="indefinite" restart="never" nodeType="tmRoot"/>
+      </p:par>
+    </p:tnLst>
+  </p:timing>
+</p:sld>
+</file>
+
+<file path=ppt/slides/slide15.xml><?xml version="1.0" encoding="utf-8"?>
+<p:sld xmlns:a="http://schemas.openxmlformats.org/drawingml/2006/main" xmlns:r="http://schemas.openxmlformats.org/officeDocument/2006/relationships" xmlns:p="http://schemas.openxmlformats.org/presentationml/2006/main">
+  <p:cSld>
+    <p:spTree>
+      <p:nvGrpSpPr>
+        <p:cNvPr id="1" name=""/>
+        <p:cNvGrpSpPr/>
+        <p:nvPr/>
+      </p:nvGrpSpPr>
+      <p:grpSpPr>
+        <a:xfrm>
+          <a:off x="0" y="0"/>
+          <a:ext cx="0" cy="0"/>
+          <a:chOff x="0" y="0"/>
+          <a:chExt cx="0" cy="0"/>
+        </a:xfrm>
+      </p:grpSpPr>
+      <p:sp>
+        <p:nvSpPr>
+          <p:cNvPr id="8194" name="Title 1"/>
+          <p:cNvSpPr>
+            <a:spLocks noGrp="1"/>
+          </p:cNvSpPr>
+          <p:nvPr>
+            <p:ph type="title"/>
+          </p:nvPr>
+        </p:nvSpPr>
+        <p:spPr/>
+        <p:txBody>
+          <a:bodyPr/>
+          <a:lstStyle/>
+          <a:p>
+            <a:r>
+              <a:rPr lang="en-US" altLang="en-US" smtClean="0"/>
+              <a:t>Contrasting XML to JSON</a:t>
+            </a:r>
+          </a:p>
+        </p:txBody>
+      </p:sp>
+      <p:sp>
+        <p:nvSpPr>
+          <p:cNvPr id="8195" name="Content Placeholder 2"/>
+          <p:cNvSpPr>
+            <a:spLocks noGrp="1"/>
+          </p:cNvSpPr>
+          <p:nvPr>
+            <p:ph idx="1"/>
+          </p:nvPr>
+        </p:nvSpPr>
+        <p:spPr>
+          <a:xfrm>
+            <a:off x="457200" y="1719263"/>
+            <a:ext cx="8534400" cy="4986337"/>
+          </a:xfrm>
+        </p:spPr>
+        <p:txBody>
+          <a:bodyPr/>
+          <a:lstStyle/>
+          <a:p>
+            <a:r>
+              <a:rPr lang="en-US" altLang="en-US" smtClean="0"/>
+              <a:t>Similarities: </a:t>
+            </a:r>
+          </a:p>
+          <a:p>
+            <a:pPr lvl="1"/>
+            <a:r>
+              <a:rPr lang="en-US" altLang="en-US" smtClean="0"/>
+              <a:t>both are</a:t>
+            </a:r>
+          </a:p>
+          <a:p>
+            <a:pPr lvl="2"/>
+            <a:r>
+              <a:rPr lang="en-US" altLang="en-US" smtClean="0"/>
+              <a:t>Plain-text</a:t>
+            </a:r>
+          </a:p>
+          <a:p>
+            <a:pPr lvl="2"/>
+            <a:r>
+              <a:rPr lang="en-US" altLang="en-US" smtClean="0"/>
+              <a:t>Self-describing (human readable)</a:t>
+            </a:r>
+          </a:p>
+          <a:p>
+            <a:pPr lvl="2"/>
+            <a:r>
+              <a:rPr lang="en-US" altLang="en-US" smtClean="0"/>
+              <a:t>Hierarchical (values nested within values)</a:t>
+            </a:r>
+          </a:p>
+          <a:p>
+            <a:endParaRPr lang="en-US" altLang="en-US" smtClean="0"/>
+          </a:p>
+          <a:p>
+            <a:r>
+              <a:rPr lang="en-US" altLang="en-US" smtClean="0"/>
+              <a:t>Differences:</a:t>
+            </a:r>
+          </a:p>
+          <a:p>
+            <a:pPr lvl="1"/>
+            <a:r>
+              <a:rPr lang="en-US" altLang="en-US" smtClean="0"/>
+              <a:t>JSON </a:t>
+            </a:r>
+          </a:p>
+          <a:p>
+            <a:pPr lvl="2"/>
+            <a:r>
+              <a:rPr lang="en-US" altLang="en-US" smtClean="0"/>
+              <a:t>Uses no end tags</a:t>
+            </a:r>
+          </a:p>
+          <a:p>
+            <a:pPr lvl="2"/>
+            <a:r>
+              <a:rPr lang="en-US" altLang="en-US" smtClean="0"/>
+              <a:t>Is shorter</a:t>
+            </a:r>
+          </a:p>
+          <a:p>
+            <a:pPr lvl="2"/>
+            <a:r>
+              <a:rPr lang="en-US" altLang="en-US" smtClean="0"/>
+              <a:t>Quicker to read and write</a:t>
+            </a:r>
+          </a:p>
+          <a:p>
+            <a:pPr lvl="2"/>
+            <a:r>
+              <a:rPr lang="en-US" altLang="en-US" smtClean="0"/>
+              <a:t>Uses arrays</a:t>
+            </a:r>
+          </a:p>
+        </p:txBody>
+      </p:sp>
+    </p:spTree>
+    <p:extLst>
+      <p:ext uri="{BB962C8B-B14F-4D97-AF65-F5344CB8AC3E}">
+        <p14:creationId xmlns:p14="http://schemas.microsoft.com/office/powerpoint/2010/main" val="3721018169"/>
+      </p:ext>
+    </p:extLst>
+  </p:cSld>
+  <p:clrMapOvr>
+    <a:masterClrMapping/>
+  </p:clrMapOvr>
+  <p:timing>
+    <p:tnLst>
+      <p:par>
+        <p:cTn id="1" dur="indefinite" restart="never" nodeType="tmRoot"/>
+      </p:par>
+    </p:tnLst>
+  </p:timing>
+</p:sld>
+</file>
+
+<file path=ppt/slides/slide16.xml><?xml version="1.0" encoding="utf-8"?>
+<p:sld xmlns:a="http://schemas.openxmlformats.org/drawingml/2006/main" xmlns:r="http://schemas.openxmlformats.org/officeDocument/2006/relationships" xmlns:p="http://schemas.openxmlformats.org/presentationml/2006/main">
+  <p:cSld>
+    <p:spTree>
+      <p:nvGrpSpPr>
+        <p:cNvPr id="1" name=""/>
+        <p:cNvGrpSpPr/>
+        <p:nvPr/>
+      </p:nvGrpSpPr>
+      <p:grpSpPr>
+        <a:xfrm>
+          <a:off x="0" y="0"/>
+          <a:ext cx="0" cy="0"/>
+          <a:chOff x="0" y="0"/>
+          <a:chExt cx="0" cy="0"/>
+        </a:xfrm>
+      </p:grpSpPr>
+      <p:sp>
+        <p:nvSpPr>
+          <p:cNvPr id="9218" name="Title 1"/>
+          <p:cNvSpPr>
+            <a:spLocks noGrp="1"/>
+          </p:cNvSpPr>
+          <p:nvPr>
+            <p:ph type="title"/>
+          </p:nvPr>
+        </p:nvSpPr>
+        <p:spPr/>
+        <p:txBody>
+          <a:bodyPr/>
+          <a:lstStyle/>
+          <a:p>
+            <a:r>
+              <a:rPr lang="en-US" altLang="en-US" smtClean="0"/>
+              <a:t>JSON syntax</a:t>
+            </a:r>
+          </a:p>
+        </p:txBody>
+      </p:sp>
+      <p:sp>
+        <p:nvSpPr>
+          <p:cNvPr id="3" name="Content Placeholder 2"/>
+          <p:cNvSpPr>
+            <a:spLocks noGrp="1"/>
+          </p:cNvSpPr>
+          <p:nvPr>
+            <p:ph idx="1"/>
+          </p:nvPr>
+        </p:nvSpPr>
+        <p:spPr>
+          <a:xfrm>
+            <a:off x="152400" y="1600200"/>
+            <a:ext cx="8839200" cy="5105400"/>
+          </a:xfrm>
+        </p:spPr>
+        <p:txBody>
+          <a:bodyPr/>
+          <a:lstStyle/>
+          <a:p>
+            <a:pPr>
+              <a:defRPr/>
+            </a:pPr>
+            <a:r>
+              <a:rPr lang="en-US" dirty="0" smtClean="0"/>
+              <a:t>JSON data</a:t>
+            </a:r>
+          </a:p>
+          <a:p>
+            <a:pPr lvl="1">
+              <a:defRPr/>
+            </a:pPr>
+            <a:r>
+              <a:rPr lang="en-US" dirty="0" smtClean="0"/>
+              <a:t>written as name/value pairs</a:t>
+            </a:r>
+          </a:p>
+          <a:p>
+            <a:pPr lvl="1">
+              <a:defRPr/>
+            </a:pPr>
+            <a:endParaRPr lang="en-US" dirty="0" smtClean="0"/>
+          </a:p>
+          <a:p>
+            <a:pPr lvl="1">
+              <a:defRPr/>
+            </a:pPr>
+            <a:r>
+              <a:rPr lang="en-US" dirty="0" smtClean="0"/>
+              <a:t>Separated by commas (,)</a:t>
+            </a:r>
+          </a:p>
+          <a:p>
+            <a:pPr>
+              <a:defRPr/>
+            </a:pPr>
+            <a:endParaRPr lang="en-US" dirty="0" smtClean="0"/>
+          </a:p>
+          <a:p>
+            <a:pPr>
+              <a:defRPr/>
+            </a:pPr>
+            <a:r>
+              <a:rPr lang="en-US" dirty="0" smtClean="0"/>
+              <a:t>JSON objects</a:t>
+            </a:r>
+          </a:p>
+          <a:p>
+            <a:pPr lvl="1">
+              <a:defRPr/>
+            </a:pPr>
+            <a:r>
+              <a:rPr lang="en-US" dirty="0" smtClean="0"/>
+              <a:t>Enclosed in curly brackets ({})</a:t>
+            </a:r>
+          </a:p>
+          <a:p>
+            <a:pPr lvl="1">
+              <a:defRPr/>
+            </a:pPr>
+            <a:endParaRPr lang="en-US" dirty="0"/>
+          </a:p>
+          <a:p>
+            <a:pPr>
+              <a:defRPr/>
+            </a:pPr>
+            <a:r>
+              <a:rPr lang="en-US" dirty="0" smtClean="0"/>
+              <a:t>JSON arrays</a:t>
+            </a:r>
+          </a:p>
+          <a:p>
+            <a:pPr lvl="1">
+              <a:defRPr/>
+            </a:pPr>
+            <a:r>
+              <a:rPr lang="en-US" dirty="0" smtClean="0"/>
+              <a:t>Delineated by </a:t>
+            </a:r>
+          </a:p>
+          <a:p>
+            <a:pPr marL="344487" lvl="1" indent="0">
+              <a:buFont typeface="Wingdings" panose="05000000000000000000" pitchFamily="2" charset="2"/>
+              <a:buNone/>
+              <a:defRPr/>
+            </a:pPr>
+            <a:r>
+              <a:rPr lang="en-US" dirty="0"/>
+              <a:t> </a:t>
+            </a:r>
+            <a:r>
+              <a:rPr lang="en-US" dirty="0" smtClean="0"/>
+              <a:t>   square brackets ([])</a:t>
+            </a:r>
+            <a:endParaRPr lang="en-US" dirty="0"/>
+          </a:p>
+        </p:txBody>
+      </p:sp>
+      <p:sp>
+        <p:nvSpPr>
+          <p:cNvPr id="9220" name="TextBox 3"/>
+          <p:cNvSpPr txBox="1">
+            <a:spLocks noChangeArrowheads="1"/>
+          </p:cNvSpPr>
+          <p:nvPr/>
+        </p:nvSpPr>
+        <p:spPr bwMode="auto">
+          <a:xfrm>
+            <a:off x="992188" y="2514600"/>
+            <a:ext cx="6172200" cy="369888"/>
+          </a:xfrm>
+          <a:prstGeom prst="rect">
+            <a:avLst/>
+          </a:prstGeom>
+          <a:noFill/>
+          <a:ln w="25400">
+            <a:solidFill>
+              <a:schemeClr val="tx1"/>
+            </a:solidFill>
+            <a:miter lim="800000"/>
+            <a:headEnd/>
+            <a:tailEnd/>
+          </a:ln>
+          <a:extLst>
+            <a:ext uri="{909E8E84-426E-40DD-AFC4-6F175D3DCCD1}">
+              <a14:hiddenFill xmlns:a14="http://schemas.microsoft.com/office/drawing/2010/main">
+                <a:solidFill>
+                  <a:srgbClr val="FFFFFF"/>
+                </a:solidFill>
+              </a14:hiddenFill>
+            </a:ext>
+          </a:extLst>
+        </p:spPr>
+        <p:txBody>
+          <a:bodyPr>
+            <a:spAutoFit/>
+          </a:bodyPr>
+          <a:lstStyle>
+            <a:lvl1pPr>
+              <a:spcBef>
+                <a:spcPct val="20000"/>
+              </a:spcBef>
+              <a:buClr>
+                <a:schemeClr val="tx2"/>
+              </a:buClr>
+              <a:buSzPct val="70000"/>
+              <a:buFont typeface="Wingdings" panose="05000000000000000000" pitchFamily="2" charset="2"/>
+              <a:buChar char="l"/>
+              <a:defRPr sz="2600">
+                <a:solidFill>
+                  <a:schemeClr val="tx1"/>
+                </a:solidFill>
+                <a:latin typeface="Arial" panose="020B0604020202020204" pitchFamily="34" charset="0"/>
+                <a:cs typeface="Arial" panose="020B0604020202020204" pitchFamily="34" charset="0"/>
+              </a:defRPr>
+            </a:lvl1pPr>
+            <a:lvl2pPr marL="742950" indent="-285750">
+              <a:spcBef>
+                <a:spcPct val="20000"/>
+              </a:spcBef>
+              <a:buClr>
+                <a:schemeClr val="accent2"/>
+              </a:buClr>
+              <a:buSzPct val="70000"/>
+              <a:buFont typeface="Wingdings" panose="05000000000000000000" pitchFamily="2" charset="2"/>
+              <a:buChar char="l"/>
+              <a:defRPr sz="2300">
+                <a:solidFill>
+                  <a:schemeClr val="tx1"/>
+                </a:solidFill>
+                <a:latin typeface="Arial" panose="020B0604020202020204" pitchFamily="34" charset="0"/>
+                <a:cs typeface="Arial" panose="020B0604020202020204" pitchFamily="34" charset="0"/>
+              </a:defRPr>
+            </a:lvl2pPr>
+            <a:lvl3pPr marL="1143000" indent="-228600">
+              <a:spcBef>
+                <a:spcPct val="20000"/>
+              </a:spcBef>
+              <a:buClr>
+                <a:schemeClr val="accent1"/>
+              </a:buClr>
+              <a:buSzPct val="70000"/>
+              <a:buFont typeface="Wingdings" panose="05000000000000000000" pitchFamily="2" charset="2"/>
+              <a:buChar char="l"/>
+              <a:defRPr sz="2000">
+                <a:solidFill>
+                  <a:schemeClr val="tx1"/>
+                </a:solidFill>
+                <a:latin typeface="Arial" panose="020B0604020202020204" pitchFamily="34" charset="0"/>
+                <a:cs typeface="Arial" panose="020B0604020202020204" pitchFamily="34" charset="0"/>
+              </a:defRPr>
+            </a:lvl3pPr>
+            <a:lvl4pPr marL="1600200" indent="-228600">
+              <a:spcBef>
+                <a:spcPct val="20000"/>
+              </a:spcBef>
+              <a:buClr>
+                <a:schemeClr val="tx2"/>
+              </a:buClr>
+              <a:buSzPct val="75000"/>
+              <a:buFont typeface="Wingdings" panose="05000000000000000000" pitchFamily="2" charset="2"/>
+              <a:buChar char="§"/>
+              <a:defRPr sz="2000">
+                <a:solidFill>
+                  <a:schemeClr val="tx1"/>
+                </a:solidFill>
+                <a:latin typeface="Arial" panose="020B0604020202020204" pitchFamily="34" charset="0"/>
+                <a:cs typeface="Arial" panose="020B0604020202020204" pitchFamily="34" charset="0"/>
+              </a:defRPr>
+            </a:lvl4pPr>
+            <a:lvl5pPr marL="2057400" indent="-228600">
+              <a:spcBef>
+                <a:spcPct val="20000"/>
+              </a:spcBef>
+              <a:buClr>
+                <a:schemeClr val="folHlink"/>
+              </a:buClr>
+              <a:buSzPct val="80000"/>
+              <a:buFont typeface="Wingdings" panose="05000000000000000000" pitchFamily="2" charset="2"/>
+              <a:buChar char="§"/>
+              <a:defRPr sz="2000">
+                <a:solidFill>
+                  <a:schemeClr val="tx1"/>
+                </a:solidFill>
+                <a:latin typeface="Arial" panose="020B0604020202020204" pitchFamily="34" charset="0"/>
+                <a:cs typeface="Arial" panose="020B0604020202020204" pitchFamily="34" charset="0"/>
+              </a:defRPr>
+            </a:lvl5pPr>
+            <a:lvl6pPr marL="2514600" indent="-228600" eaLnBrk="0" fontAlgn="base" hangingPunct="0">
+              <a:spcBef>
+                <a:spcPct val="20000"/>
+              </a:spcBef>
+              <a:spcAft>
+                <a:spcPct val="0"/>
+              </a:spcAft>
+              <a:buClr>
+                <a:schemeClr val="folHlink"/>
+              </a:buClr>
+              <a:buSzPct val="80000"/>
+              <a:buFont typeface="Wingdings" panose="05000000000000000000" pitchFamily="2" charset="2"/>
+              <a:buChar char="§"/>
+              <a:defRPr sz="2000">
+                <a:solidFill>
+                  <a:schemeClr val="tx1"/>
+                </a:solidFill>
+                <a:latin typeface="Arial" panose="020B0604020202020204" pitchFamily="34" charset="0"/>
+                <a:cs typeface="Arial" panose="020B0604020202020204" pitchFamily="34" charset="0"/>
+              </a:defRPr>
+            </a:lvl6pPr>
+            <a:lvl7pPr marL="2971800" indent="-228600" eaLnBrk="0" fontAlgn="base" hangingPunct="0">
+              <a:spcBef>
+                <a:spcPct val="20000"/>
+              </a:spcBef>
+              <a:spcAft>
+                <a:spcPct val="0"/>
+              </a:spcAft>
+              <a:buClr>
+                <a:schemeClr val="folHlink"/>
+              </a:buClr>
+              <a:buSzPct val="80000"/>
+              <a:buFont typeface="Wingdings" panose="05000000000000000000" pitchFamily="2" charset="2"/>
+              <a:buChar char="§"/>
+              <a:defRPr sz="2000">
+                <a:solidFill>
+                  <a:schemeClr val="tx1"/>
+                </a:solidFill>
+                <a:latin typeface="Arial" panose="020B0604020202020204" pitchFamily="34" charset="0"/>
+                <a:cs typeface="Arial" panose="020B0604020202020204" pitchFamily="34" charset="0"/>
+              </a:defRPr>
+            </a:lvl7pPr>
+            <a:lvl8pPr marL="3429000" indent="-228600" eaLnBrk="0" fontAlgn="base" hangingPunct="0">
+              <a:spcBef>
+                <a:spcPct val="20000"/>
+              </a:spcBef>
+              <a:spcAft>
+                <a:spcPct val="0"/>
+              </a:spcAft>
+              <a:buClr>
+                <a:schemeClr val="folHlink"/>
+              </a:buClr>
+              <a:buSzPct val="80000"/>
+              <a:buFont typeface="Wingdings" panose="05000000000000000000" pitchFamily="2" charset="2"/>
+              <a:buChar char="§"/>
+              <a:defRPr sz="2000">
+                <a:solidFill>
+                  <a:schemeClr val="tx1"/>
+                </a:solidFill>
+                <a:latin typeface="Arial" panose="020B0604020202020204" pitchFamily="34" charset="0"/>
+                <a:cs typeface="Arial" panose="020B0604020202020204" pitchFamily="34" charset="0"/>
+              </a:defRPr>
+            </a:lvl8pPr>
+            <a:lvl9pPr marL="3886200" indent="-228600" eaLnBrk="0" fontAlgn="base" hangingPunct="0">
+              <a:spcBef>
+                <a:spcPct val="20000"/>
+              </a:spcBef>
+              <a:spcAft>
+                <a:spcPct val="0"/>
+              </a:spcAft>
+              <a:buClr>
+                <a:schemeClr val="folHlink"/>
+              </a:buClr>
+              <a:buSzPct val="80000"/>
+              <a:buFont typeface="Wingdings" panose="05000000000000000000" pitchFamily="2" charset="2"/>
+              <a:buChar char="§"/>
+              <a:defRPr sz="2000">
+                <a:solidFill>
+                  <a:schemeClr val="tx1"/>
+                </a:solidFill>
+                <a:latin typeface="Arial" panose="020B0604020202020204" pitchFamily="34" charset="0"/>
+                <a:cs typeface="Arial" panose="020B0604020202020204" pitchFamily="34" charset="0"/>
+              </a:defRPr>
+            </a:lvl9pPr>
+          </a:lstStyle>
+          <a:p>
+            <a:pPr algn="ctr" eaLnBrk="1" hangingPunct="1">
+              <a:spcBef>
+                <a:spcPct val="0"/>
+              </a:spcBef>
+              <a:buClrTx/>
+              <a:buSzTx/>
+              <a:buFontTx/>
+              <a:buNone/>
+            </a:pPr>
+            <a:r>
+              <a:rPr lang="en-US" altLang="en-US" sz="1800">
+                <a:solidFill>
+                  <a:srgbClr val="000000"/>
+                </a:solidFill>
+                <a:latin typeface="courier new" panose="02070309020205020404" pitchFamily="49" charset="0"/>
+              </a:rPr>
+              <a:t>"firstName" : "John"</a:t>
+            </a:r>
+            <a:endParaRPr lang="en-US" altLang="en-US" sz="1800"/>
+          </a:p>
+        </p:txBody>
+      </p:sp>
+      <p:sp>
+        <p:nvSpPr>
+          <p:cNvPr id="9221" name="TextBox 4"/>
+          <p:cNvSpPr txBox="1">
+            <a:spLocks noChangeArrowheads="1"/>
+          </p:cNvSpPr>
+          <p:nvPr/>
+        </p:nvSpPr>
+        <p:spPr bwMode="auto">
+          <a:xfrm>
+            <a:off x="990600" y="4811713"/>
+            <a:ext cx="6172200" cy="369887"/>
+          </a:xfrm>
+          <a:prstGeom prst="rect">
+            <a:avLst/>
+          </a:prstGeom>
+          <a:noFill/>
+          <a:ln w="25400">
+            <a:solidFill>
+              <a:schemeClr val="tx1"/>
+            </a:solidFill>
+            <a:miter lim="800000"/>
+            <a:headEnd/>
+            <a:tailEnd/>
+          </a:ln>
+          <a:extLst>
+            <a:ext uri="{909E8E84-426E-40DD-AFC4-6F175D3DCCD1}">
+              <a14:hiddenFill xmlns:a14="http://schemas.microsoft.com/office/drawing/2010/main">
+                <a:solidFill>
+                  <a:srgbClr val="FFFFFF"/>
+                </a:solidFill>
+              </a14:hiddenFill>
+            </a:ext>
+          </a:extLst>
+        </p:spPr>
+        <p:txBody>
+          <a:bodyPr>
+            <a:spAutoFit/>
+          </a:bodyPr>
+          <a:lstStyle>
+            <a:lvl1pPr>
+              <a:spcBef>
+                <a:spcPct val="20000"/>
+              </a:spcBef>
+              <a:buClr>
+                <a:schemeClr val="tx2"/>
+              </a:buClr>
+              <a:buSzPct val="70000"/>
+              <a:buFont typeface="Wingdings" panose="05000000000000000000" pitchFamily="2" charset="2"/>
+              <a:buChar char="l"/>
+              <a:defRPr sz="2600">
+                <a:solidFill>
+                  <a:schemeClr val="tx1"/>
+                </a:solidFill>
+                <a:latin typeface="Arial" panose="020B0604020202020204" pitchFamily="34" charset="0"/>
+                <a:cs typeface="Arial" panose="020B0604020202020204" pitchFamily="34" charset="0"/>
+              </a:defRPr>
+            </a:lvl1pPr>
+            <a:lvl2pPr marL="742950" indent="-285750">
+              <a:spcBef>
+                <a:spcPct val="20000"/>
+              </a:spcBef>
+              <a:buClr>
+                <a:schemeClr val="accent2"/>
+              </a:buClr>
+              <a:buSzPct val="70000"/>
+              <a:buFont typeface="Wingdings" panose="05000000000000000000" pitchFamily="2" charset="2"/>
+              <a:buChar char="l"/>
+              <a:defRPr sz="2300">
+                <a:solidFill>
+                  <a:schemeClr val="tx1"/>
+                </a:solidFill>
+                <a:latin typeface="Arial" panose="020B0604020202020204" pitchFamily="34" charset="0"/>
+                <a:cs typeface="Arial" panose="020B0604020202020204" pitchFamily="34" charset="0"/>
+              </a:defRPr>
+            </a:lvl2pPr>
+            <a:lvl3pPr marL="1143000" indent="-228600">
+              <a:spcBef>
+                <a:spcPct val="20000"/>
+              </a:spcBef>
+              <a:buClr>
+                <a:schemeClr val="accent1"/>
+              </a:buClr>
+              <a:buSzPct val="70000"/>
+              <a:buFont typeface="Wingdings" panose="05000000000000000000" pitchFamily="2" charset="2"/>
+              <a:buChar char="l"/>
+              <a:defRPr sz="2000">
+                <a:solidFill>
+                  <a:schemeClr val="tx1"/>
+                </a:solidFill>
+                <a:latin typeface="Arial" panose="020B0604020202020204" pitchFamily="34" charset="0"/>
+                <a:cs typeface="Arial" panose="020B0604020202020204" pitchFamily="34" charset="0"/>
+              </a:defRPr>
+            </a:lvl3pPr>
+            <a:lvl4pPr marL="1600200" indent="-228600">
+              <a:spcBef>
+                <a:spcPct val="20000"/>
+              </a:spcBef>
+              <a:buClr>
+                <a:schemeClr val="tx2"/>
+              </a:buClr>
+              <a:buSzPct val="75000"/>
+              <a:buFont typeface="Wingdings" panose="05000000000000000000" pitchFamily="2" charset="2"/>
+              <a:buChar char="§"/>
+              <a:defRPr sz="2000">
+                <a:solidFill>
+                  <a:schemeClr val="tx1"/>
+                </a:solidFill>
+                <a:latin typeface="Arial" panose="020B0604020202020204" pitchFamily="34" charset="0"/>
+                <a:cs typeface="Arial" panose="020B0604020202020204" pitchFamily="34" charset="0"/>
+              </a:defRPr>
+            </a:lvl4pPr>
+            <a:lvl5pPr marL="2057400" indent="-228600">
+              <a:spcBef>
+                <a:spcPct val="20000"/>
+              </a:spcBef>
+              <a:buClr>
+                <a:schemeClr val="folHlink"/>
+              </a:buClr>
+              <a:buSzPct val="80000"/>
+              <a:buFont typeface="Wingdings" panose="05000000000000000000" pitchFamily="2" charset="2"/>
+              <a:buChar char="§"/>
+              <a:defRPr sz="2000">
+                <a:solidFill>
+                  <a:schemeClr val="tx1"/>
+                </a:solidFill>
+                <a:latin typeface="Arial" panose="020B0604020202020204" pitchFamily="34" charset="0"/>
+                <a:cs typeface="Arial" panose="020B0604020202020204" pitchFamily="34" charset="0"/>
+              </a:defRPr>
+            </a:lvl5pPr>
+            <a:lvl6pPr marL="2514600" indent="-228600" eaLnBrk="0" fontAlgn="base" hangingPunct="0">
+              <a:spcBef>
+                <a:spcPct val="20000"/>
+              </a:spcBef>
+              <a:spcAft>
+                <a:spcPct val="0"/>
+              </a:spcAft>
+              <a:buClr>
+                <a:schemeClr val="folHlink"/>
+              </a:buClr>
+              <a:buSzPct val="80000"/>
+              <a:buFont typeface="Wingdings" panose="05000000000000000000" pitchFamily="2" charset="2"/>
+              <a:buChar char="§"/>
+              <a:defRPr sz="2000">
+                <a:solidFill>
+                  <a:schemeClr val="tx1"/>
+                </a:solidFill>
+                <a:latin typeface="Arial" panose="020B0604020202020204" pitchFamily="34" charset="0"/>
+                <a:cs typeface="Arial" panose="020B0604020202020204" pitchFamily="34" charset="0"/>
+              </a:defRPr>
+            </a:lvl6pPr>
+            <a:lvl7pPr marL="2971800" indent="-228600" eaLnBrk="0" fontAlgn="base" hangingPunct="0">
+              <a:spcBef>
+                <a:spcPct val="20000"/>
+              </a:spcBef>
+              <a:spcAft>
+                <a:spcPct val="0"/>
+              </a:spcAft>
+              <a:buClr>
+                <a:schemeClr val="folHlink"/>
+              </a:buClr>
+              <a:buSzPct val="80000"/>
+              <a:buFont typeface="Wingdings" panose="05000000000000000000" pitchFamily="2" charset="2"/>
+              <a:buChar char="§"/>
+              <a:defRPr sz="2000">
+                <a:solidFill>
+                  <a:schemeClr val="tx1"/>
+                </a:solidFill>
+                <a:latin typeface="Arial" panose="020B0604020202020204" pitchFamily="34" charset="0"/>
+                <a:cs typeface="Arial" panose="020B0604020202020204" pitchFamily="34" charset="0"/>
+              </a:defRPr>
+            </a:lvl7pPr>
+            <a:lvl8pPr marL="3429000" indent="-228600" eaLnBrk="0" fontAlgn="base" hangingPunct="0">
+              <a:spcBef>
+                <a:spcPct val="20000"/>
+              </a:spcBef>
+              <a:spcAft>
+                <a:spcPct val="0"/>
+              </a:spcAft>
+              <a:buClr>
+                <a:schemeClr val="folHlink"/>
+              </a:buClr>
+              <a:buSzPct val="80000"/>
+              <a:buFont typeface="Wingdings" panose="05000000000000000000" pitchFamily="2" charset="2"/>
+              <a:buChar char="§"/>
+              <a:defRPr sz="2000">
+                <a:solidFill>
+                  <a:schemeClr val="tx1"/>
+                </a:solidFill>
+                <a:latin typeface="Arial" panose="020B0604020202020204" pitchFamily="34" charset="0"/>
+                <a:cs typeface="Arial" panose="020B0604020202020204" pitchFamily="34" charset="0"/>
+              </a:defRPr>
+            </a:lvl8pPr>
+            <a:lvl9pPr marL="3886200" indent="-228600" eaLnBrk="0" fontAlgn="base" hangingPunct="0">
+              <a:spcBef>
+                <a:spcPct val="20000"/>
+              </a:spcBef>
+              <a:spcAft>
+                <a:spcPct val="0"/>
+              </a:spcAft>
+              <a:buClr>
+                <a:schemeClr val="folHlink"/>
+              </a:buClr>
+              <a:buSzPct val="80000"/>
+              <a:buFont typeface="Wingdings" panose="05000000000000000000" pitchFamily="2" charset="2"/>
+              <a:buChar char="§"/>
+              <a:defRPr sz="2000">
+                <a:solidFill>
+                  <a:schemeClr val="tx1"/>
+                </a:solidFill>
+                <a:latin typeface="Arial" panose="020B0604020202020204" pitchFamily="34" charset="0"/>
+                <a:cs typeface="Arial" panose="020B0604020202020204" pitchFamily="34" charset="0"/>
+              </a:defRPr>
+            </a:lvl9pPr>
+          </a:lstStyle>
+          <a:p>
+            <a:pPr algn="ctr" eaLnBrk="1" hangingPunct="1">
+              <a:spcBef>
+                <a:spcPct val="0"/>
+              </a:spcBef>
+              <a:buClrTx/>
+              <a:buSzTx/>
+              <a:buFontTx/>
+              <a:buNone/>
+            </a:pPr>
+            <a:r>
+              <a:rPr lang="en-US" altLang="en-US" sz="1800">
+                <a:solidFill>
+                  <a:srgbClr val="000000"/>
+                </a:solidFill>
+                <a:latin typeface="courier new" panose="02070309020205020404" pitchFamily="49" charset="0"/>
+              </a:rPr>
+              <a:t>{ "firstName":"John" , "lastName":"Doe" }</a:t>
+            </a:r>
+            <a:endParaRPr lang="en-US" altLang="en-US" sz="1800"/>
+          </a:p>
+        </p:txBody>
+      </p:sp>
+      <p:sp>
+        <p:nvSpPr>
+          <p:cNvPr id="9222" name="TextBox 5"/>
+          <p:cNvSpPr txBox="1">
+            <a:spLocks noChangeArrowheads="1"/>
+          </p:cNvSpPr>
+          <p:nvPr/>
+        </p:nvSpPr>
+        <p:spPr bwMode="auto">
+          <a:xfrm>
+            <a:off x="3886200" y="5335588"/>
+            <a:ext cx="4724400" cy="1446212"/>
+          </a:xfrm>
+          <a:prstGeom prst="rect">
+            <a:avLst/>
+          </a:prstGeom>
+          <a:noFill/>
+          <a:ln w="25400">
+            <a:solidFill>
+              <a:schemeClr val="tx1"/>
+            </a:solidFill>
+            <a:miter lim="800000"/>
+            <a:headEnd/>
+            <a:tailEnd/>
+          </a:ln>
+          <a:extLst>
+            <a:ext uri="{909E8E84-426E-40DD-AFC4-6F175D3DCCD1}">
+              <a14:hiddenFill xmlns:a14="http://schemas.microsoft.com/office/drawing/2010/main">
+                <a:solidFill>
+                  <a:srgbClr val="FFFFFF"/>
+                </a:solidFill>
+              </a14:hiddenFill>
+            </a:ext>
+          </a:extLst>
+        </p:spPr>
+        <p:txBody>
+          <a:bodyPr>
+            <a:spAutoFit/>
+          </a:bodyPr>
+          <a:lstStyle>
+            <a:lvl1pPr>
+              <a:spcBef>
+                <a:spcPct val="20000"/>
+              </a:spcBef>
+              <a:buClr>
+                <a:schemeClr val="tx2"/>
+              </a:buClr>
+              <a:buSzPct val="70000"/>
+              <a:buFont typeface="Wingdings" panose="05000000000000000000" pitchFamily="2" charset="2"/>
+              <a:buChar char="l"/>
+              <a:defRPr sz="2600">
+                <a:solidFill>
+                  <a:schemeClr val="tx1"/>
+                </a:solidFill>
+                <a:latin typeface="Arial" panose="020B0604020202020204" pitchFamily="34" charset="0"/>
+                <a:cs typeface="Arial" panose="020B0604020202020204" pitchFamily="34" charset="0"/>
+              </a:defRPr>
+            </a:lvl1pPr>
+            <a:lvl2pPr marL="742950" indent="-285750">
+              <a:spcBef>
+                <a:spcPct val="20000"/>
+              </a:spcBef>
+              <a:buClr>
+                <a:schemeClr val="accent2"/>
+              </a:buClr>
+              <a:buSzPct val="70000"/>
+              <a:buFont typeface="Wingdings" panose="05000000000000000000" pitchFamily="2" charset="2"/>
+              <a:buChar char="l"/>
+              <a:defRPr sz="2300">
+                <a:solidFill>
+                  <a:schemeClr val="tx1"/>
+                </a:solidFill>
+                <a:latin typeface="Arial" panose="020B0604020202020204" pitchFamily="34" charset="0"/>
+                <a:cs typeface="Arial" panose="020B0604020202020204" pitchFamily="34" charset="0"/>
+              </a:defRPr>
+            </a:lvl2pPr>
+            <a:lvl3pPr marL="1143000" indent="-228600">
+              <a:spcBef>
+                <a:spcPct val="20000"/>
+              </a:spcBef>
+              <a:buClr>
+                <a:schemeClr val="accent1"/>
+              </a:buClr>
+              <a:buSzPct val="70000"/>
+              <a:buFont typeface="Wingdings" panose="05000000000000000000" pitchFamily="2" charset="2"/>
+              <a:buChar char="l"/>
+              <a:defRPr sz="2000">
+                <a:solidFill>
+                  <a:schemeClr val="tx1"/>
+                </a:solidFill>
+                <a:latin typeface="Arial" panose="020B0604020202020204" pitchFamily="34" charset="0"/>
+                <a:cs typeface="Arial" panose="020B0604020202020204" pitchFamily="34" charset="0"/>
+              </a:defRPr>
+            </a:lvl3pPr>
+            <a:lvl4pPr marL="1600200" indent="-228600">
+              <a:spcBef>
+                <a:spcPct val="20000"/>
+              </a:spcBef>
+              <a:buClr>
+                <a:schemeClr val="tx2"/>
+              </a:buClr>
+              <a:buSzPct val="75000"/>
+              <a:buFont typeface="Wingdings" panose="05000000000000000000" pitchFamily="2" charset="2"/>
+              <a:buChar char="§"/>
+              <a:defRPr sz="2000">
+                <a:solidFill>
+                  <a:schemeClr val="tx1"/>
+                </a:solidFill>
+                <a:latin typeface="Arial" panose="020B0604020202020204" pitchFamily="34" charset="0"/>
+                <a:cs typeface="Arial" panose="020B0604020202020204" pitchFamily="34" charset="0"/>
+              </a:defRPr>
+            </a:lvl4pPr>
+            <a:lvl5pPr marL="2057400" indent="-228600">
+              <a:spcBef>
+                <a:spcPct val="20000"/>
+              </a:spcBef>
+              <a:buClr>
+                <a:schemeClr val="folHlink"/>
+              </a:buClr>
+              <a:buSzPct val="80000"/>
+              <a:buFont typeface="Wingdings" panose="05000000000000000000" pitchFamily="2" charset="2"/>
+              <a:buChar char="§"/>
+              <a:defRPr sz="2000">
+                <a:solidFill>
+                  <a:schemeClr val="tx1"/>
+                </a:solidFill>
+                <a:latin typeface="Arial" panose="020B0604020202020204" pitchFamily="34" charset="0"/>
+                <a:cs typeface="Arial" panose="020B0604020202020204" pitchFamily="34" charset="0"/>
+              </a:defRPr>
+            </a:lvl5pPr>
+            <a:lvl6pPr marL="2514600" indent="-228600" eaLnBrk="0" fontAlgn="base" hangingPunct="0">
+              <a:spcBef>
+                <a:spcPct val="20000"/>
+              </a:spcBef>
+              <a:spcAft>
+                <a:spcPct val="0"/>
+              </a:spcAft>
+              <a:buClr>
+                <a:schemeClr val="folHlink"/>
+              </a:buClr>
+              <a:buSzPct val="80000"/>
+              <a:buFont typeface="Wingdings" panose="05000000000000000000" pitchFamily="2" charset="2"/>
+              <a:buChar char="§"/>
+              <a:defRPr sz="2000">
+                <a:solidFill>
+                  <a:schemeClr val="tx1"/>
+                </a:solidFill>
+                <a:latin typeface="Arial" panose="020B0604020202020204" pitchFamily="34" charset="0"/>
+                <a:cs typeface="Arial" panose="020B0604020202020204" pitchFamily="34" charset="0"/>
+              </a:defRPr>
+            </a:lvl6pPr>
+            <a:lvl7pPr marL="2971800" indent="-228600" eaLnBrk="0" fontAlgn="base" hangingPunct="0">
+              <a:spcBef>
+                <a:spcPct val="20000"/>
+              </a:spcBef>
+              <a:spcAft>
+                <a:spcPct val="0"/>
+              </a:spcAft>
+              <a:buClr>
+                <a:schemeClr val="folHlink"/>
+              </a:buClr>
+              <a:buSzPct val="80000"/>
+              <a:buFont typeface="Wingdings" panose="05000000000000000000" pitchFamily="2" charset="2"/>
+              <a:buChar char="§"/>
+              <a:defRPr sz="2000">
+                <a:solidFill>
+                  <a:schemeClr val="tx1"/>
+                </a:solidFill>
+                <a:latin typeface="Arial" panose="020B0604020202020204" pitchFamily="34" charset="0"/>
+                <a:cs typeface="Arial" panose="020B0604020202020204" pitchFamily="34" charset="0"/>
+              </a:defRPr>
+            </a:lvl7pPr>
+            <a:lvl8pPr marL="3429000" indent="-228600" eaLnBrk="0" fontAlgn="base" hangingPunct="0">
+              <a:spcBef>
+                <a:spcPct val="20000"/>
+              </a:spcBef>
+              <a:spcAft>
+                <a:spcPct val="0"/>
+              </a:spcAft>
+              <a:buClr>
+                <a:schemeClr val="folHlink"/>
+              </a:buClr>
+              <a:buSzPct val="80000"/>
+              <a:buFont typeface="Wingdings" panose="05000000000000000000" pitchFamily="2" charset="2"/>
+              <a:buChar char="§"/>
+              <a:defRPr sz="2000">
+                <a:solidFill>
+                  <a:schemeClr val="tx1"/>
+                </a:solidFill>
+                <a:latin typeface="Arial" panose="020B0604020202020204" pitchFamily="34" charset="0"/>
+                <a:cs typeface="Arial" panose="020B0604020202020204" pitchFamily="34" charset="0"/>
+              </a:defRPr>
+            </a:lvl8pPr>
+            <a:lvl9pPr marL="3886200" indent="-228600" eaLnBrk="0" fontAlgn="base" hangingPunct="0">
+              <a:spcBef>
+                <a:spcPct val="20000"/>
+              </a:spcBef>
+              <a:spcAft>
+                <a:spcPct val="0"/>
+              </a:spcAft>
+              <a:buClr>
+                <a:schemeClr val="folHlink"/>
+              </a:buClr>
+              <a:buSzPct val="80000"/>
+              <a:buFont typeface="Wingdings" panose="05000000000000000000" pitchFamily="2" charset="2"/>
+              <a:buChar char="§"/>
+              <a:defRPr sz="2000">
+                <a:solidFill>
+                  <a:schemeClr val="tx1"/>
+                </a:solidFill>
+                <a:latin typeface="Arial" panose="020B0604020202020204" pitchFamily="34" charset="0"/>
+                <a:cs typeface="Arial" panose="020B0604020202020204" pitchFamily="34" charset="0"/>
+              </a:defRPr>
+            </a:lvl9pPr>
+          </a:lstStyle>
+          <a:p>
+            <a:pPr eaLnBrk="1" hangingPunct="1">
+              <a:spcBef>
+                <a:spcPct val="0"/>
+              </a:spcBef>
+              <a:buClrTx/>
+              <a:buSzTx/>
+              <a:buFontTx/>
+              <a:buNone/>
+            </a:pPr>
+            <a:r>
+              <a:rPr lang="en-US" altLang="en-US" sz="1200">
+                <a:solidFill>
+                  <a:srgbClr val="000000"/>
+                </a:solidFill>
+                <a:latin typeface="courier new" panose="02070309020205020404" pitchFamily="49" charset="0"/>
+              </a:rPr>
+              <a:t>{</a:t>
+            </a:r>
+            <a:r>
+              <a:rPr lang="en-US" altLang="en-US" sz="1200"/>
+              <a:t/>
+            </a:r>
+            <a:br>
+              <a:rPr lang="en-US" altLang="en-US" sz="1200"/>
+            </a:br>
+            <a:r>
+              <a:rPr lang="en-US" altLang="en-US" sz="1200">
+                <a:solidFill>
+                  <a:srgbClr val="000000"/>
+                </a:solidFill>
+                <a:latin typeface="courier new" panose="02070309020205020404" pitchFamily="49" charset="0"/>
+              </a:rPr>
+              <a:t>"employees": [</a:t>
+            </a:r>
+            <a:r>
+              <a:rPr lang="en-US" altLang="en-US" sz="1200"/>
+              <a:t/>
+            </a:r>
+            <a:br>
+              <a:rPr lang="en-US" altLang="en-US" sz="1200"/>
+            </a:br>
+            <a:r>
+              <a:rPr lang="en-US" altLang="en-US" sz="1200">
+                <a:solidFill>
+                  <a:srgbClr val="000000"/>
+                </a:solidFill>
+                <a:latin typeface="courier new" panose="02070309020205020404" pitchFamily="49" charset="0"/>
+              </a:rPr>
+              <a:t>{ "firstName":"John" , "lastName":"Doe" }, </a:t>
+            </a:r>
+            <a:r>
+              <a:rPr lang="en-US" altLang="en-US" sz="1200"/>
+              <a:t/>
+            </a:r>
+            <a:br>
+              <a:rPr lang="en-US" altLang="en-US" sz="1200"/>
+            </a:br>
+            <a:r>
+              <a:rPr lang="en-US" altLang="en-US" sz="1200">
+                <a:solidFill>
+                  <a:srgbClr val="000000"/>
+                </a:solidFill>
+                <a:latin typeface="courier new" panose="02070309020205020404" pitchFamily="49" charset="0"/>
+              </a:rPr>
+              <a:t>{ "firstName":"Anna" , "lastName":"Smith" }, </a:t>
+            </a:r>
+            <a:r>
+              <a:rPr lang="en-US" altLang="en-US" sz="1200"/>
+              <a:t/>
+            </a:r>
+            <a:br>
+              <a:rPr lang="en-US" altLang="en-US" sz="1200"/>
+            </a:br>
+            <a:r>
+              <a:rPr lang="en-US" altLang="en-US" sz="1200">
+                <a:solidFill>
+                  <a:srgbClr val="000000"/>
+                </a:solidFill>
+                <a:latin typeface="courier new" panose="02070309020205020404" pitchFamily="49" charset="0"/>
+              </a:rPr>
+              <a:t>{ "firstName":"Peter" , "lastName":"Jones" }</a:t>
+            </a:r>
+            <a:r>
+              <a:rPr lang="en-US" altLang="en-US" sz="1400"/>
+              <a:t/>
+            </a:r>
+            <a:br>
+              <a:rPr lang="en-US" altLang="en-US" sz="1400"/>
+            </a:br>
+            <a:r>
+              <a:rPr lang="en-US" altLang="en-US" sz="1400">
+                <a:solidFill>
+                  <a:srgbClr val="000000"/>
+                </a:solidFill>
+                <a:latin typeface="courier new" panose="02070309020205020404" pitchFamily="49" charset="0"/>
+              </a:rPr>
+              <a:t>]</a:t>
+            </a:r>
+            <a:r>
+              <a:rPr lang="en-US" altLang="en-US" sz="1400"/>
+              <a:t/>
+            </a:r>
+            <a:br>
+              <a:rPr lang="en-US" altLang="en-US" sz="1400"/>
+            </a:br>
+            <a:r>
+              <a:rPr lang="en-US" altLang="en-US" sz="1400">
+                <a:solidFill>
+                  <a:srgbClr val="000000"/>
+                </a:solidFill>
+                <a:latin typeface="courier new" panose="02070309020205020404" pitchFamily="49" charset="0"/>
+              </a:rPr>
+              <a:t>}</a:t>
+            </a:r>
+            <a:endParaRPr lang="en-US" altLang="en-US" sz="1400"/>
+          </a:p>
+        </p:txBody>
+      </p:sp>
+    </p:spTree>
+    <p:extLst>
+      <p:ext uri="{BB962C8B-B14F-4D97-AF65-F5344CB8AC3E}">
+        <p14:creationId xmlns:p14="http://schemas.microsoft.com/office/powerpoint/2010/main" val="820455485"/>
+      </p:ext>
+    </p:extLst>
+  </p:cSld>
+  <p:clrMapOvr>
+    <a:masterClrMapping/>
+  </p:clrMapOvr>
+  <p:timing>
+    <p:tnLst>
+      <p:par>
+        <p:cTn id="1" dur="indefinite" restart="never" nodeType="tmRoot"/>
+      </p:par>
+    </p:tnLst>
+  </p:timing>
+</p:sld>
+</file>
+
 <file path=ppt/slides/slide2.xml><?xml version="1.0" encoding="utf-8"?>
 <p:sld xmlns:a="http://schemas.openxmlformats.org/drawingml/2006/main" xmlns:r="http://schemas.openxmlformats.org/officeDocument/2006/relationships" xmlns:p="http://schemas.openxmlformats.org/presentationml/2006/main">
   <p:cSld>
@@ -21009,7 +23159,7 @@
         </p:nvGraphicFramePr>
         <p:xfrm>
           <a:off x="1960563" y="1719263"/>
-          <a:ext cx="5222875" cy="5013325"/>
+          <a:ext cx="5222876" cy="5013329"/>
         </p:xfrm>
         <a:graphic>
           <a:graphicData uri="http://schemas.openxmlformats.org/drawingml/2006/table">
@@ -22346,7 +24496,7 @@
         </p:nvGraphicFramePr>
         <p:xfrm>
           <a:off x="1524000" y="1397000"/>
-          <a:ext cx="6096000" cy="4933950"/>
+          <a:ext cx="6096000" cy="4933947"/>
         </p:xfrm>
         <a:graphic>
           <a:graphicData uri="http://schemas.openxmlformats.org/drawingml/2006/table">

</xml_diff>